<commit_message>
Update Kubernetes Integrated Development Environment 1.pptx
</commit_message>
<xml_diff>
--- a/2025-09-29 Dotnext/Kubernetes Integrated Development Environment 1.pptx
+++ b/2025-09-29 Dotnext/Kubernetes Integrated Development Environment 1.pptx
@@ -289,7 +289,7 @@
           <a:p>
             <a:fld id="{62164A38-496E-4635-AD4D-E4F60A7AA5BC}" type="datetimeFigureOut">
               <a:rPr lang="tr-TR" smtClean="0"/>
-              <a:t>24.05.2024</a:t>
+              <a:t>3.04.2025</a:t>
             </a:fld>
             <a:endParaRPr lang="tr-TR"/>
           </a:p>
@@ -487,7 +487,7 @@
           <a:p>
             <a:fld id="{62164A38-496E-4635-AD4D-E4F60A7AA5BC}" type="datetimeFigureOut">
               <a:rPr lang="tr-TR" smtClean="0"/>
-              <a:t>24.05.2024</a:t>
+              <a:t>3.04.2025</a:t>
             </a:fld>
             <a:endParaRPr lang="tr-TR"/>
           </a:p>
@@ -695,7 +695,7 @@
           <a:p>
             <a:fld id="{62164A38-496E-4635-AD4D-E4F60A7AA5BC}" type="datetimeFigureOut">
               <a:rPr lang="tr-TR" smtClean="0"/>
-              <a:t>24.05.2024</a:t>
+              <a:t>3.04.2025</a:t>
             </a:fld>
             <a:endParaRPr lang="tr-TR"/>
           </a:p>
@@ -893,7 +893,7 @@
           <a:p>
             <a:fld id="{62164A38-496E-4635-AD4D-E4F60A7AA5BC}" type="datetimeFigureOut">
               <a:rPr lang="tr-TR" smtClean="0"/>
-              <a:t>24.05.2024</a:t>
+              <a:t>3.04.2025</a:t>
             </a:fld>
             <a:endParaRPr lang="tr-TR"/>
           </a:p>
@@ -1168,7 +1168,7 @@
           <a:p>
             <a:fld id="{62164A38-496E-4635-AD4D-E4F60A7AA5BC}" type="datetimeFigureOut">
               <a:rPr lang="tr-TR" smtClean="0"/>
-              <a:t>24.05.2024</a:t>
+              <a:t>3.04.2025</a:t>
             </a:fld>
             <a:endParaRPr lang="tr-TR"/>
           </a:p>
@@ -1433,7 +1433,7 @@
           <a:p>
             <a:fld id="{62164A38-496E-4635-AD4D-E4F60A7AA5BC}" type="datetimeFigureOut">
               <a:rPr lang="tr-TR" smtClean="0"/>
-              <a:t>24.05.2024</a:t>
+              <a:t>3.04.2025</a:t>
             </a:fld>
             <a:endParaRPr lang="tr-TR"/>
           </a:p>
@@ -1845,7 +1845,7 @@
           <a:p>
             <a:fld id="{62164A38-496E-4635-AD4D-E4F60A7AA5BC}" type="datetimeFigureOut">
               <a:rPr lang="tr-TR" smtClean="0"/>
-              <a:t>24.05.2024</a:t>
+              <a:t>3.04.2025</a:t>
             </a:fld>
             <a:endParaRPr lang="tr-TR"/>
           </a:p>
@@ -1986,7 +1986,7 @@
           <a:p>
             <a:fld id="{62164A38-496E-4635-AD4D-E4F60A7AA5BC}" type="datetimeFigureOut">
               <a:rPr lang="tr-TR" smtClean="0"/>
-              <a:t>24.05.2024</a:t>
+              <a:t>3.04.2025</a:t>
             </a:fld>
             <a:endParaRPr lang="tr-TR"/>
           </a:p>
@@ -2099,7 +2099,7 @@
           <a:p>
             <a:fld id="{62164A38-496E-4635-AD4D-E4F60A7AA5BC}" type="datetimeFigureOut">
               <a:rPr lang="tr-TR" smtClean="0"/>
-              <a:t>24.05.2024</a:t>
+              <a:t>3.04.2025</a:t>
             </a:fld>
             <a:endParaRPr lang="tr-TR"/>
           </a:p>
@@ -2410,7 +2410,7 @@
           <a:p>
             <a:fld id="{62164A38-496E-4635-AD4D-E4F60A7AA5BC}" type="datetimeFigureOut">
               <a:rPr lang="tr-TR" smtClean="0"/>
-              <a:t>24.05.2024</a:t>
+              <a:t>3.04.2025</a:t>
             </a:fld>
             <a:endParaRPr lang="tr-TR"/>
           </a:p>
@@ -2698,7 +2698,7 @@
           <a:p>
             <a:fld id="{62164A38-496E-4635-AD4D-E4F60A7AA5BC}" type="datetimeFigureOut">
               <a:rPr lang="tr-TR" smtClean="0"/>
-              <a:t>24.05.2024</a:t>
+              <a:t>3.04.2025</a:t>
             </a:fld>
             <a:endParaRPr lang="tr-TR"/>
           </a:p>
@@ -2939,7 +2939,7 @@
           <a:p>
             <a:fld id="{62164A38-496E-4635-AD4D-E4F60A7AA5BC}" type="datetimeFigureOut">
               <a:rPr lang="tr-TR" smtClean="0"/>
-              <a:t>24.05.2024</a:t>
+              <a:t>3.04.2025</a:t>
             </a:fld>
             <a:endParaRPr lang="tr-TR"/>
           </a:p>
@@ -3828,8 +3828,27 @@
                 <a:ea typeface="Open Sans" pitchFamily="2" charset="0"/>
                 <a:cs typeface="Open Sans" pitchFamily="2" charset="0"/>
               </a:rPr>
-              <a:t>.NET Aspire (preview)</a:t>
-            </a:r>
+              <a:t>.</a:t>
+            </a:r>
+            <a:r>
+              <a:rPr lang="tr-TR" sz="3200">
+                <a:solidFill>
+                  <a:srgbClr val="5B636F"/>
+                </a:solidFill>
+                <a:latin typeface="Open Sans" pitchFamily="2" charset="0"/>
+                <a:ea typeface="Open Sans" pitchFamily="2" charset="0"/>
+                <a:cs typeface="Open Sans" pitchFamily="2" charset="0"/>
+              </a:rPr>
+              <a:t>NET Aspire</a:t>
+            </a:r>
+            <a:endParaRPr lang="tr-TR" sz="3200" dirty="0">
+              <a:solidFill>
+                <a:srgbClr val="5B636F"/>
+              </a:solidFill>
+              <a:latin typeface="Open Sans" pitchFamily="2" charset="0"/>
+              <a:ea typeface="Open Sans" pitchFamily="2" charset="0"/>
+              <a:cs typeface="Open Sans" pitchFamily="2" charset="0"/>
+            </a:endParaRPr>
           </a:p>
         </p:txBody>
       </p:sp>

</xml_diff>